<commit_message>
upload tai lieu xu ly nhieu background
</commit_message>
<xml_diff>
--- a/bao cao tuan/Bao cao tien do.pptx
+++ b/bao cao tuan/Bao cao tien do.pptx
@@ -5,7 +5,7 @@
     <p:sldMasterId id="2147483708" r:id="rId1"/>
   </p:sldMasterIdLst>
   <p:notesMasterIdLst>
-    <p:notesMasterId r:id="rId17"/>
+    <p:notesMasterId r:id="rId18"/>
   </p:notesMasterIdLst>
   <p:sldIdLst>
     <p:sldId id="256" r:id="rId2"/>
@@ -15,14 +15,15 @@
     <p:sldId id="260" r:id="rId6"/>
     <p:sldId id="261" r:id="rId7"/>
     <p:sldId id="262" r:id="rId8"/>
-    <p:sldId id="263" r:id="rId9"/>
-    <p:sldId id="264" r:id="rId10"/>
-    <p:sldId id="265" r:id="rId11"/>
-    <p:sldId id="266" r:id="rId12"/>
-    <p:sldId id="267" r:id="rId13"/>
-    <p:sldId id="268" r:id="rId14"/>
-    <p:sldId id="270" r:id="rId15"/>
-    <p:sldId id="271" r:id="rId16"/>
+    <p:sldId id="272" r:id="rId9"/>
+    <p:sldId id="263" r:id="rId10"/>
+    <p:sldId id="264" r:id="rId11"/>
+    <p:sldId id="265" r:id="rId12"/>
+    <p:sldId id="266" r:id="rId13"/>
+    <p:sldId id="267" r:id="rId14"/>
+    <p:sldId id="268" r:id="rId15"/>
+    <p:sldId id="270" r:id="rId16"/>
+    <p:sldId id="271" r:id="rId17"/>
   </p:sldIdLst>
   <p:sldSz cx="9144000" cy="6858000" type="screen4x3"/>
   <p:notesSz cx="6858000" cy="9144000"/>
@@ -3908,21 +3909,15 @@
           <a:bodyPr/>
           <a:lstStyle/>
           <a:p>
-            <a:pPr marL="571500" indent="-571500">
+            <a:pPr marL="1028700" indent="-1028700">
               <a:buFont typeface="+mj-lt"/>
-              <a:buAutoNum type="romanUcPeriod" startAt="3"/>
+              <a:buAutoNum type="romanUcPeriod" startAt="2"/>
             </a:pPr>
             <a:r>
-              <a:rPr lang="en-US" sz="4000" dirty="0" smtClean="0">
-                <a:latin typeface="Times New Roman" pitchFamily="18" charset="0"/>
-                <a:cs typeface="Times New Roman" pitchFamily="18" charset="0"/>
-              </a:rPr>
-              <a:t>Graduation Thesis Layout</a:t>
-            </a:r>
-            <a:endParaRPr lang="en-US" sz="4000" dirty="0">
-              <a:latin typeface="Times New Roman" pitchFamily="18" charset="0"/>
-              <a:cs typeface="Times New Roman" pitchFamily="18" charset="0"/>
-            </a:endParaRPr>
+              <a:rPr lang="en-US" dirty="0" smtClean="0"/>
+              <a:t>Solution</a:t>
+            </a:r>
+            <a:endParaRPr lang="en-US" dirty="0"/>
           </a:p>
         </p:txBody>
       </p:sp>
@@ -3941,20 +3936,83 @@
           <a:bodyPr/>
           <a:lstStyle/>
           <a:p>
-            <a:endParaRPr lang="en-US" dirty="0"/>
+            <a:pPr marL="114300" indent="0">
+              <a:buNone/>
+            </a:pPr>
+            <a:r>
+              <a:rPr lang="en-US" dirty="0" smtClean="0"/>
+              <a:t>III. Semantic </a:t>
+            </a:r>
+            <a:r>
+              <a:rPr lang="en-US" dirty="0"/>
+              <a:t>Processing</a:t>
+            </a:r>
+          </a:p>
+          <a:p>
+            <a:r>
+              <a:rPr lang="en-US" dirty="0" smtClean="0"/>
+              <a:t>A</a:t>
+            </a:r>
+          </a:p>
+          <a:p>
+            <a:r>
+              <a:rPr lang="en-US" dirty="0" smtClean="0"/>
+              <a:t>B</a:t>
+            </a:r>
+          </a:p>
+          <a:p>
+            <a:r>
+              <a:rPr lang="en-US" dirty="0" smtClean="0"/>
+              <a:t>C</a:t>
+            </a:r>
+          </a:p>
+          <a:p>
+            <a:pPr marL="114300" indent="0">
+              <a:buNone/>
+            </a:pPr>
+            <a:r>
+              <a:rPr lang="en-US" dirty="0" smtClean="0"/>
+              <a:t>IV. Translate Processing</a:t>
+            </a:r>
+            <a:endParaRPr lang="en-US" dirty="0" smtClean="0"/>
+          </a:p>
+          <a:p>
+            <a:r>
+              <a:rPr lang="en-US" dirty="0" smtClean="0"/>
+              <a:t>A</a:t>
+            </a:r>
+          </a:p>
+          <a:p>
+            <a:r>
+              <a:rPr lang="en-US" dirty="0" smtClean="0"/>
+              <a:t>B</a:t>
+            </a:r>
+          </a:p>
+          <a:p>
+            <a:r>
+              <a:rPr lang="en-US" dirty="0"/>
+              <a:t>C</a:t>
+            </a:r>
           </a:p>
         </p:txBody>
       </p:sp>
     </p:spTree>
     <p:extLst>
       <p:ext uri="{BB962C8B-B14F-4D97-AF65-F5344CB8AC3E}">
-        <p14:creationId xmlns:p14="http://schemas.microsoft.com/office/powerpoint/2010/main" val="1560344083"/>
+        <p14:creationId xmlns:p14="http://schemas.microsoft.com/office/powerpoint/2010/main" val="2477521977"/>
       </p:ext>
     </p:extLst>
   </p:cSld>
   <p:clrMapOvr>
     <a:masterClrMapping/>
   </p:clrMapOvr>
+  <p:timing>
+    <p:tnLst>
+      <p:par>
+        <p:cTn id="1" dur="indefinite" restart="never" nodeType="tmRoot"/>
+      </p:par>
+    </p:tnLst>
+  </p:timing>
 </p:sld>
 </file>
 
@@ -4030,13 +4088,20 @@
     </p:spTree>
     <p:extLst>
       <p:ext uri="{BB962C8B-B14F-4D97-AF65-F5344CB8AC3E}">
-        <p14:creationId xmlns:p14="http://schemas.microsoft.com/office/powerpoint/2010/main" val="3568809386"/>
+        <p14:creationId xmlns:p14="http://schemas.microsoft.com/office/powerpoint/2010/main" val="1560344083"/>
       </p:ext>
     </p:extLst>
   </p:cSld>
   <p:clrMapOvr>
     <a:masterClrMapping/>
   </p:clrMapOvr>
+  <p:timing>
+    <p:tnLst>
+      <p:par>
+        <p:cTn id="1" dur="indefinite" restart="never" nodeType="tmRoot"/>
+      </p:par>
+    </p:tnLst>
+  </p:timing>
 </p:sld>
 </file>
 
@@ -4154,26 +4219,21 @@
           <a:bodyPr/>
           <a:lstStyle/>
           <a:p>
-            <a:pPr marL="857250" indent="-857250">
+            <a:pPr marL="571500" indent="-571500">
               <a:buFont typeface="+mj-lt"/>
-              <a:buAutoNum type="romanUcPeriod" startAt="4"/>
+              <a:buAutoNum type="romanUcPeriod" startAt="3"/>
             </a:pPr>
             <a:r>
-              <a:rPr lang="en-US" sz="4400" dirty="0">
+              <a:rPr lang="en-US" sz="4000" dirty="0" smtClean="0">
                 <a:latin typeface="Times New Roman" pitchFamily="18" charset="0"/>
                 <a:cs typeface="Times New Roman" pitchFamily="18" charset="0"/>
               </a:rPr>
-              <a:t>Graduation Thesis </a:t>
-            </a:r>
-            <a:r>
-              <a:rPr lang="en-US" sz="4000" dirty="0"/>
-              <a:t>P</a:t>
-            </a:r>
-            <a:r>
-              <a:rPr lang="en-US" sz="4000" dirty="0" smtClean="0"/>
-              <a:t>rocess</a:t>
-            </a:r>
-            <a:endParaRPr lang="en-US" sz="4000" dirty="0"/>
+              <a:t>Graduation Thesis Layout</a:t>
+            </a:r>
+            <a:endParaRPr lang="en-US" sz="4000" dirty="0">
+              <a:latin typeface="Times New Roman" pitchFamily="18" charset="0"/>
+              <a:cs typeface="Times New Roman" pitchFamily="18" charset="0"/>
+            </a:endParaRPr>
           </a:p>
         </p:txBody>
       </p:sp>
@@ -4199,7 +4259,7 @@
     </p:spTree>
     <p:extLst>
       <p:ext uri="{BB962C8B-B14F-4D97-AF65-F5344CB8AC3E}">
-        <p14:creationId xmlns:p14="http://schemas.microsoft.com/office/powerpoint/2010/main" val="2163420818"/>
+        <p14:creationId xmlns:p14="http://schemas.microsoft.com/office/powerpoint/2010/main" val="3568809386"/>
       </p:ext>
     </p:extLst>
   </p:cSld>
@@ -4243,6 +4303,93 @@
           <a:p>
             <a:pPr marL="857250" indent="-857250">
               <a:buFont typeface="+mj-lt"/>
+              <a:buAutoNum type="romanUcPeriod" startAt="4"/>
+            </a:pPr>
+            <a:r>
+              <a:rPr lang="en-US" sz="4400" dirty="0">
+                <a:latin typeface="Times New Roman" pitchFamily="18" charset="0"/>
+                <a:cs typeface="Times New Roman" pitchFamily="18" charset="0"/>
+              </a:rPr>
+              <a:t>Graduation Thesis </a:t>
+            </a:r>
+            <a:r>
+              <a:rPr lang="en-US" sz="4000" dirty="0"/>
+              <a:t>P</a:t>
+            </a:r>
+            <a:r>
+              <a:rPr lang="en-US" sz="4000" dirty="0" smtClean="0"/>
+              <a:t>rocess</a:t>
+            </a:r>
+            <a:endParaRPr lang="en-US" sz="4000" dirty="0"/>
+          </a:p>
+        </p:txBody>
+      </p:sp>
+      <p:sp>
+        <p:nvSpPr>
+          <p:cNvPr id="3" name="Content Placeholder 2"/>
+          <p:cNvSpPr>
+            <a:spLocks noGrp="1"/>
+          </p:cNvSpPr>
+          <p:nvPr>
+            <p:ph idx="1"/>
+          </p:nvPr>
+        </p:nvSpPr>
+        <p:spPr/>
+        <p:txBody>
+          <a:bodyPr/>
+          <a:lstStyle/>
+          <a:p>
+            <a:endParaRPr lang="en-US" dirty="0"/>
+          </a:p>
+        </p:txBody>
+      </p:sp>
+    </p:spTree>
+    <p:extLst>
+      <p:ext uri="{BB962C8B-B14F-4D97-AF65-F5344CB8AC3E}">
+        <p14:creationId xmlns:p14="http://schemas.microsoft.com/office/powerpoint/2010/main" val="2163420818"/>
+      </p:ext>
+    </p:extLst>
+  </p:cSld>
+  <p:clrMapOvr>
+    <a:masterClrMapping/>
+  </p:clrMapOvr>
+</p:sld>
+</file>
+
+<file path=ppt/slides/slide15.xml><?xml version="1.0" encoding="utf-8"?>
+<p:sld xmlns:a="http://schemas.openxmlformats.org/drawingml/2006/main" xmlns:r="http://schemas.openxmlformats.org/officeDocument/2006/relationships" xmlns:p="http://schemas.openxmlformats.org/presentationml/2006/main">
+  <p:cSld>
+    <p:spTree>
+      <p:nvGrpSpPr>
+        <p:cNvPr id="1" name=""/>
+        <p:cNvGrpSpPr/>
+        <p:nvPr/>
+      </p:nvGrpSpPr>
+      <p:grpSpPr>
+        <a:xfrm>
+          <a:off x="0" y="0"/>
+          <a:ext cx="0" cy="0"/>
+          <a:chOff x="0" y="0"/>
+          <a:chExt cx="0" cy="0"/>
+        </a:xfrm>
+      </p:grpSpPr>
+      <p:sp>
+        <p:nvSpPr>
+          <p:cNvPr id="2" name="Title 1"/>
+          <p:cNvSpPr>
+            <a:spLocks noGrp="1"/>
+          </p:cNvSpPr>
+          <p:nvPr>
+            <p:ph type="title"/>
+          </p:nvPr>
+        </p:nvSpPr>
+        <p:spPr/>
+        <p:txBody>
+          <a:bodyPr/>
+          <a:lstStyle/>
+          <a:p>
+            <a:pPr marL="857250" indent="-857250">
+              <a:buFont typeface="+mj-lt"/>
               <a:buAutoNum type="romanUcPeriod" startAt="5"/>
             </a:pPr>
             <a:r>
@@ -4292,7 +4439,7 @@
 </p:sld>
 </file>
 
-<file path=ppt/slides/slide15.xml><?xml version="1.0" encoding="utf-8"?>
+<file path=ppt/slides/slide16.xml><?xml version="1.0" encoding="utf-8"?>
 <p:sld xmlns:a="http://schemas.openxmlformats.org/drawingml/2006/main" xmlns:r="http://schemas.openxmlformats.org/officeDocument/2006/relationships" xmlns:p="http://schemas.openxmlformats.org/presentationml/2006/main">
   <p:cSld>
     <p:spTree>
@@ -4611,6 +4758,13 @@
   <p:clrMapOvr>
     <a:masterClrMapping/>
   </p:clrMapOvr>
+  <p:timing>
+    <p:tnLst>
+      <p:par>
+        <p:cTn id="1" dur="indefinite" restart="never" nodeType="tmRoot"/>
+      </p:par>
+    </p:tnLst>
+  </p:timing>
 </p:sld>
 </file>
 
@@ -4691,6 +4845,13 @@
   <p:clrMapOvr>
     <a:masterClrMapping/>
   </p:clrMapOvr>
+  <p:timing>
+    <p:tnLst>
+      <p:par>
+        <p:cTn id="1" dur="indefinite" restart="never" nodeType="tmRoot"/>
+      </p:par>
+    </p:tnLst>
+  </p:timing>
 </p:sld>
 </file>
 
@@ -4750,12 +4911,138 @@
         </p:nvSpPr>
         <p:spPr/>
         <p:txBody>
-          <a:bodyPr/>
-          <a:lstStyle/>
-          <a:p>
+          <a:bodyPr>
+            <a:normAutofit lnSpcReduction="10000"/>
+          </a:bodyPr>
+          <a:lstStyle/>
+          <a:p>
+            <a:pPr marL="114300" indent="0">
+              <a:buNone/>
+            </a:pPr>
             <a:r>
               <a:rPr lang="en-US" dirty="0" smtClean="0"/>
-              <a:t>Outline</a:t>
+              <a:t>Outline:</a:t>
+            </a:r>
+          </a:p>
+          <a:p>
+            <a:pPr marL="628650" indent="-514350">
+              <a:buFont typeface="+mj-lt"/>
+              <a:buAutoNum type="romanLcPeriod"/>
+            </a:pPr>
+            <a:r>
+              <a:rPr lang="en-US" dirty="0" smtClean="0"/>
+              <a:t>Image Preprocessing </a:t>
+            </a:r>
+          </a:p>
+          <a:p>
+            <a:pPr marL="925830" lvl="1" indent="-514350">
+              <a:buFont typeface="+mj-lt"/>
+              <a:buAutoNum type="romanLcPeriod"/>
+            </a:pPr>
+            <a:r>
+              <a:rPr lang="en-US" dirty="0" smtClean="0"/>
+              <a:t>Classification input quality</a:t>
+            </a:r>
+            <a:endParaRPr lang="en-US" dirty="0" smtClean="0"/>
+          </a:p>
+          <a:p>
+            <a:pPr marL="925830" lvl="1" indent="-514350">
+              <a:buFont typeface="+mj-lt"/>
+              <a:buAutoNum type="romanLcPeriod"/>
+            </a:pPr>
+            <a:r>
+              <a:rPr lang="en-US" dirty="0" smtClean="0"/>
+              <a:t>Remove background</a:t>
+            </a:r>
+          </a:p>
+          <a:p>
+            <a:pPr marL="925830" lvl="1" indent="-514350">
+              <a:buFont typeface="+mj-lt"/>
+              <a:buAutoNum type="romanLcPeriod"/>
+            </a:pPr>
+            <a:r>
+              <a:rPr lang="en-US" dirty="0" smtClean="0"/>
+              <a:t>De-skew</a:t>
+            </a:r>
+          </a:p>
+          <a:p>
+            <a:pPr marL="925830" lvl="1" indent="-514350">
+              <a:buFont typeface="+mj-lt"/>
+              <a:buAutoNum type="romanLcPeriod"/>
+            </a:pPr>
+            <a:r>
+              <a:rPr lang="en-US" dirty="0" smtClean="0"/>
+              <a:t>Remove noise</a:t>
+            </a:r>
+          </a:p>
+          <a:p>
+            <a:pPr marL="925830" lvl="1" indent="-514350">
+              <a:buFont typeface="+mj-lt"/>
+              <a:buAutoNum type="romanLcPeriod"/>
+            </a:pPr>
+            <a:r>
+              <a:rPr lang="en-US" dirty="0" smtClean="0"/>
+              <a:t>Word separate </a:t>
+            </a:r>
+          </a:p>
+          <a:p>
+            <a:pPr marL="925830" lvl="1" indent="-514350">
+              <a:buFont typeface="+mj-lt"/>
+              <a:buAutoNum type="romanLcPeriod"/>
+            </a:pPr>
+            <a:r>
+              <a:rPr lang="en-US" dirty="0" smtClean="0"/>
+              <a:t>Word extraction information </a:t>
+            </a:r>
+          </a:p>
+          <a:p>
+            <a:pPr marL="628650" indent="-514350">
+              <a:buFont typeface="+mj-lt"/>
+              <a:buAutoNum type="romanLcPeriod"/>
+            </a:pPr>
+            <a:r>
+              <a:rPr lang="en-US" dirty="0" smtClean="0"/>
+              <a:t>Recognition Processing</a:t>
+            </a:r>
+          </a:p>
+          <a:p>
+            <a:pPr marL="925830" lvl="1" indent="-514350">
+              <a:buFont typeface="+mj-lt"/>
+              <a:buAutoNum type="romanLcPeriod"/>
+            </a:pPr>
+            <a:r>
+              <a:rPr lang="en-US" dirty="0" smtClean="0"/>
+              <a:t>Using multilayer perceptron</a:t>
+            </a:r>
+          </a:p>
+          <a:p>
+            <a:pPr marL="628650" indent="-514350">
+              <a:buFont typeface="+mj-lt"/>
+              <a:buAutoNum type="romanLcPeriod"/>
+            </a:pPr>
+            <a:r>
+              <a:rPr lang="en-US" dirty="0" smtClean="0"/>
+              <a:t>Semantic Processing</a:t>
+            </a:r>
+          </a:p>
+          <a:p>
+            <a:pPr marL="925830" lvl="1" indent="-514350">
+              <a:buFont typeface="+mj-lt"/>
+              <a:buAutoNum type="romanLcPeriod"/>
+            </a:pPr>
+            <a:r>
+              <a:rPr lang="en-US" dirty="0" smtClean="0"/>
+              <a:t>Using dictionary</a:t>
+            </a:r>
+          </a:p>
+          <a:p>
+            <a:pPr marL="628650" indent="-514350">
+              <a:buFont typeface="+mj-lt"/>
+              <a:buAutoNum type="romanLcPeriod"/>
+            </a:pPr>
+            <a:r>
+              <a:rPr lang="en-US" dirty="0" smtClean="0"/>
+              <a:t>Translate Processing</a:t>
             </a:r>
             <a:endParaRPr lang="en-US" dirty="0"/>
           </a:p>
@@ -4771,6 +5058,13 @@
   <p:clrMapOvr>
     <a:masterClrMapping/>
   </p:clrMapOvr>
+  <p:timing>
+    <p:tnLst>
+      <p:par>
+        <p:cTn id="1" dur="indefinite" restart="never" nodeType="tmRoot"/>
+      </p:par>
+    </p:tnLst>
+  </p:timing>
 </p:sld>
 </file>
 
@@ -4833,7 +5127,19 @@
           <a:bodyPr/>
           <a:lstStyle/>
           <a:p>
-            <a:endParaRPr lang="en-US"/>
+            <a:pPr marL="628650" indent="-514350">
+              <a:buAutoNum type="romanUcPeriod"/>
+            </a:pPr>
+            <a:r>
+              <a:rPr lang="en-US" smtClean="0"/>
+              <a:t>Image Preprocessing</a:t>
+            </a:r>
+          </a:p>
+          <a:p>
+            <a:pPr marL="114300" indent="0">
+              <a:buNone/>
+            </a:pPr>
+            <a:endParaRPr lang="en-US" dirty="0"/>
           </a:p>
         </p:txBody>
       </p:sp>
@@ -4847,6 +5153,13 @@
   <p:clrMapOvr>
     <a:masterClrMapping/>
   </p:clrMapOvr>
+  <p:timing>
+    <p:tnLst>
+      <p:par>
+        <p:cTn id="1" dur="indefinite" restart="never" nodeType="tmRoot"/>
+      </p:par>
+    </p:tnLst>
+  </p:timing>
 </p:sld>
 </file>
 
@@ -4909,20 +5222,27 @@
           <a:bodyPr/>
           <a:lstStyle/>
           <a:p>
-            <a:endParaRPr lang="en-US"/>
+            <a:endParaRPr lang="en-US" dirty="0"/>
           </a:p>
         </p:txBody>
       </p:sp>
     </p:spTree>
     <p:extLst>
       <p:ext uri="{BB962C8B-B14F-4D97-AF65-F5344CB8AC3E}">
-        <p14:creationId xmlns:p14="http://schemas.microsoft.com/office/powerpoint/2010/main" val="2477521977"/>
+        <p14:creationId xmlns:p14="http://schemas.microsoft.com/office/powerpoint/2010/main" val="1092609932"/>
       </p:ext>
     </p:extLst>
   </p:cSld>
   <p:clrMapOvr>
     <a:masterClrMapping/>
   </p:clrMapOvr>
+  <p:timing>
+    <p:tnLst>
+      <p:par>
+        <p:cTn id="1" dur="indefinite" restart="never" nodeType="tmRoot"/>
+      </p:par>
+    </p:tnLst>
+  </p:timing>
 </p:sld>
 </file>
 
@@ -4982,10 +5302,112 @@
         </p:nvSpPr>
         <p:spPr/>
         <p:txBody>
-          <a:bodyPr/>
-          <a:lstStyle/>
-          <a:p>
-            <a:endParaRPr lang="en-US"/>
+          <a:bodyPr>
+            <a:normAutofit/>
+          </a:bodyPr>
+          <a:lstStyle/>
+          <a:p>
+            <a:pPr marL="114300" indent="0">
+              <a:buNone/>
+            </a:pPr>
+            <a:r>
+              <a:rPr lang="en-US" sz="2800" b="1" dirty="0" smtClean="0"/>
+              <a:t>II. Recognition processing</a:t>
+            </a:r>
+          </a:p>
+          <a:p>
+            <a:r>
+              <a:rPr lang="en-US" b="1" dirty="0" smtClean="0"/>
+              <a:t>Used neutron network for recognition task</a:t>
+            </a:r>
+          </a:p>
+          <a:p>
+            <a:pPr lvl="1"/>
+            <a:r>
+              <a:rPr lang="en-US" dirty="0"/>
+              <a:t>It is fast</a:t>
+            </a:r>
+          </a:p>
+          <a:p>
+            <a:pPr lvl="1"/>
+            <a:r>
+              <a:rPr lang="en-US" dirty="0"/>
+              <a:t>It is light</a:t>
+            </a:r>
+          </a:p>
+          <a:p>
+            <a:pPr lvl="1"/>
+            <a:r>
+              <a:rPr lang="en-US" dirty="0"/>
+              <a:t>Easy  to change the speed, accurate of neutron network </a:t>
+            </a:r>
+          </a:p>
+          <a:p>
+            <a:pPr lvl="1"/>
+            <a:r>
+              <a:rPr lang="en-US" dirty="0"/>
+              <a:t>Good result for hieroglyphics  character </a:t>
+            </a:r>
+            <a:endParaRPr lang="en-US" b="1" dirty="0" smtClean="0"/>
+          </a:p>
+          <a:p>
+            <a:r>
+              <a:rPr lang="en-US" b="1" dirty="0" smtClean="0"/>
+              <a:t>Multi layer Perceptron</a:t>
+            </a:r>
+          </a:p>
+          <a:p>
+            <a:pPr lvl="1"/>
+            <a:r>
+              <a:rPr lang="en-US" b="1" dirty="0" err="1" smtClean="0"/>
+              <a:t>Trainning</a:t>
+            </a:r>
+            <a:r>
+              <a:rPr lang="en-US" b="1" dirty="0" smtClean="0"/>
+              <a:t> Process</a:t>
+            </a:r>
+          </a:p>
+          <a:p>
+            <a:pPr lvl="2"/>
+            <a:r>
+              <a:rPr lang="en-US" dirty="0"/>
+              <a:t>Input layer: 24x24 input signal</a:t>
+            </a:r>
+          </a:p>
+          <a:p>
+            <a:pPr lvl="2"/>
+            <a:r>
+              <a:rPr lang="en-US" dirty="0"/>
+              <a:t>Output layer: 16 binary bits output</a:t>
+            </a:r>
+          </a:p>
+          <a:p>
+            <a:pPr lvl="2"/>
+            <a:r>
+              <a:rPr lang="en-US" dirty="0"/>
+              <a:t>Hidden layer: is customize for good </a:t>
+            </a:r>
+            <a:r>
+              <a:rPr lang="en-US" dirty="0" smtClean="0"/>
+              <a:t>result</a:t>
+            </a:r>
+            <a:endParaRPr lang="en-US" b="1" dirty="0" smtClean="0"/>
+          </a:p>
+          <a:p>
+            <a:pPr lvl="1"/>
+            <a:r>
+              <a:rPr lang="en-US" b="1" dirty="0" smtClean="0"/>
+              <a:t>Weight array</a:t>
+            </a:r>
+            <a:endParaRPr lang="en-US" b="1" dirty="0" smtClean="0"/>
+          </a:p>
+          <a:p>
+            <a:pPr lvl="1"/>
+            <a:endParaRPr lang="en-US" dirty="0" smtClean="0"/>
+          </a:p>
+          <a:p>
+            <a:pPr lvl="1"/>
+            <a:endParaRPr lang="en-US" dirty="0"/>
           </a:p>
         </p:txBody>
       </p:sp>
@@ -4999,6 +5421,13 @@
   <p:clrMapOvr>
     <a:masterClrMapping/>
   </p:clrMapOvr>
+  <p:timing>
+    <p:tnLst>
+      <p:par>
+        <p:cTn id="1" dur="indefinite" restart="never" nodeType="tmRoot"/>
+      </p:par>
+    </p:tnLst>
+  </p:timing>
 </p:sld>
 </file>
 

</xml_diff>